<commit_message>
Temp Local for NEZ Analysis
Committing a local copy of a working version of the NEZ analysis tool before attempting to fix the Dark Proj aspect of the code
</commit_message>
<xml_diff>
--- a/Analysis Data/20231113UT Map Plots.pptx
+++ b/Analysis Data/20231113UT Map Plots.pptx
@@ -6,6 +6,9 @@
   </p:sldMasterIdLst>
   <p:sldIdLst>
     <p:sldId id="257" r:id="rId2"/>
+    <p:sldId id="259" r:id="rId3"/>
+    <p:sldId id="258" r:id="rId4"/>
+    <p:sldId id="260" r:id="rId5"/>
   </p:sldIdLst>
   <p:sldSz cx="12192000" cy="6858000"/>
   <p:notesSz cx="6858000" cy="9144000"/>
@@ -104,6 +107,11 @@
       </a:defRPr>
     </a:lvl9pPr>
   </p:defaultTextStyle>
+  <p:extLst>
+    <p:ext uri="{EFAFB233-063F-42B5-8137-9DF3F51BA10A}">
+      <p15:sldGuideLst xmlns:p15="http://schemas.microsoft.com/office/powerpoint/2012/main"/>
+    </p:ext>
+  </p:extLst>
 </p:presentation>
 </file>
 
@@ -254,7 +262,7 @@
           <a:p>
             <a:fld id="{59D42C0B-D54C-41EC-B7D4-EBF5A2B79BF9}" type="datetimeFigureOut">
               <a:rPr lang="en-US" smtClean="0"/>
-              <a:t>1/4/2024</a:t>
+              <a:t>1/18/2024</a:t>
             </a:fld>
             <a:endParaRPr lang="en-US"/>
           </a:p>
@@ -452,7 +460,7 @@
           <a:p>
             <a:fld id="{59D42C0B-D54C-41EC-B7D4-EBF5A2B79BF9}" type="datetimeFigureOut">
               <a:rPr lang="en-US" smtClean="0"/>
-              <a:t>1/4/2024</a:t>
+              <a:t>1/18/2024</a:t>
             </a:fld>
             <a:endParaRPr lang="en-US"/>
           </a:p>
@@ -660,7 +668,7 @@
           <a:p>
             <a:fld id="{59D42C0B-D54C-41EC-B7D4-EBF5A2B79BF9}" type="datetimeFigureOut">
               <a:rPr lang="en-US" smtClean="0"/>
-              <a:t>1/4/2024</a:t>
+              <a:t>1/18/2024</a:t>
             </a:fld>
             <a:endParaRPr lang="en-US"/>
           </a:p>
@@ -858,7 +866,7 @@
           <a:p>
             <a:fld id="{59D42C0B-D54C-41EC-B7D4-EBF5A2B79BF9}" type="datetimeFigureOut">
               <a:rPr lang="en-US" smtClean="0"/>
-              <a:t>1/4/2024</a:t>
+              <a:t>1/18/2024</a:t>
             </a:fld>
             <a:endParaRPr lang="en-US"/>
           </a:p>
@@ -1133,7 +1141,7 @@
           <a:p>
             <a:fld id="{59D42C0B-D54C-41EC-B7D4-EBF5A2B79BF9}" type="datetimeFigureOut">
               <a:rPr lang="en-US" smtClean="0"/>
-              <a:t>1/4/2024</a:t>
+              <a:t>1/18/2024</a:t>
             </a:fld>
             <a:endParaRPr lang="en-US"/>
           </a:p>
@@ -1398,7 +1406,7 @@
           <a:p>
             <a:fld id="{59D42C0B-D54C-41EC-B7D4-EBF5A2B79BF9}" type="datetimeFigureOut">
               <a:rPr lang="en-US" smtClean="0"/>
-              <a:t>1/4/2024</a:t>
+              <a:t>1/18/2024</a:t>
             </a:fld>
             <a:endParaRPr lang="en-US"/>
           </a:p>
@@ -1810,7 +1818,7 @@
           <a:p>
             <a:fld id="{59D42C0B-D54C-41EC-B7D4-EBF5A2B79BF9}" type="datetimeFigureOut">
               <a:rPr lang="en-US" smtClean="0"/>
-              <a:t>1/4/2024</a:t>
+              <a:t>1/18/2024</a:t>
             </a:fld>
             <a:endParaRPr lang="en-US"/>
           </a:p>
@@ -1951,7 +1959,7 @@
           <a:p>
             <a:fld id="{59D42C0B-D54C-41EC-B7D4-EBF5A2B79BF9}" type="datetimeFigureOut">
               <a:rPr lang="en-US" smtClean="0"/>
-              <a:t>1/4/2024</a:t>
+              <a:t>1/18/2024</a:t>
             </a:fld>
             <a:endParaRPr lang="en-US"/>
           </a:p>
@@ -2064,7 +2072,7 @@
           <a:p>
             <a:fld id="{59D42C0B-D54C-41EC-B7D4-EBF5A2B79BF9}" type="datetimeFigureOut">
               <a:rPr lang="en-US" smtClean="0"/>
-              <a:t>1/4/2024</a:t>
+              <a:t>1/18/2024</a:t>
             </a:fld>
             <a:endParaRPr lang="en-US"/>
           </a:p>
@@ -2375,7 +2383,7 @@
           <a:p>
             <a:fld id="{59D42C0B-D54C-41EC-B7D4-EBF5A2B79BF9}" type="datetimeFigureOut">
               <a:rPr lang="en-US" smtClean="0"/>
-              <a:t>1/4/2024</a:t>
+              <a:t>1/18/2024</a:t>
             </a:fld>
             <a:endParaRPr lang="en-US"/>
           </a:p>
@@ -2663,7 +2671,7 @@
           <a:p>
             <a:fld id="{59D42C0B-D54C-41EC-B7D4-EBF5A2B79BF9}" type="datetimeFigureOut">
               <a:rPr lang="en-US" smtClean="0"/>
-              <a:t>1/4/2024</a:t>
+              <a:t>1/18/2024</a:t>
             </a:fld>
             <a:endParaRPr lang="en-US"/>
           </a:p>
@@ -2904,7 +2912,7 @@
           <a:p>
             <a:fld id="{59D42C0B-D54C-41EC-B7D4-EBF5A2B79BF9}" type="datetimeFigureOut">
               <a:rPr lang="en-US" smtClean="0"/>
-              <a:t>1/4/2024</a:t>
+              <a:t>1/18/2024</a:t>
             </a:fld>
             <a:endParaRPr lang="en-US"/>
           </a:p>
@@ -3911,6 +3919,898 @@
 </p:sld>
 </file>
 
+<file path=ppt/slides/slide2.xml><?xml version="1.0" encoding="utf-8"?>
+<p:sld xmlns:a="http://schemas.openxmlformats.org/drawingml/2006/main" xmlns:r="http://schemas.openxmlformats.org/officeDocument/2006/relationships" xmlns:p="http://schemas.openxmlformats.org/presentationml/2006/main">
+  <p:cSld>
+    <p:spTree>
+      <p:nvGrpSpPr>
+        <p:cNvPr id="1" name=""/>
+        <p:cNvGrpSpPr/>
+        <p:nvPr/>
+      </p:nvGrpSpPr>
+      <p:grpSpPr>
+        <a:xfrm>
+          <a:off x="0" y="0"/>
+          <a:ext cx="0" cy="0"/>
+          <a:chOff x="0" y="0"/>
+          <a:chExt cx="0" cy="0"/>
+        </a:xfrm>
+      </p:grpSpPr>
+      <p:pic>
+        <p:nvPicPr>
+          <p:cNvPr id="2" name="Picture 1" descr="A screen shot of a chart&#10;&#10;Description automatically generated">
+            <a:extLst>
+              <a:ext uri="{FF2B5EF4-FFF2-40B4-BE49-F238E27FC236}">
+                <a16:creationId xmlns:a16="http://schemas.microsoft.com/office/drawing/2014/main" id="{3B89B397-D9D0-1427-8093-15B46427458F}"/>
+              </a:ext>
+            </a:extLst>
+          </p:cNvPr>
+          <p:cNvPicPr>
+            <a:picLocks noChangeAspect="1"/>
+          </p:cNvPicPr>
+          <p:nvPr/>
+        </p:nvPicPr>
+        <p:blipFill>
+          <a:blip r:embed="rId2" cstate="print">
+            <a:extLst>
+              <a:ext uri="{28A0092B-C50C-407E-A947-70E740481C1C}">
+                <a14:useLocalDpi xmlns:a14="http://schemas.microsoft.com/office/drawing/2010/main" val="0"/>
+              </a:ext>
+            </a:extLst>
+          </a:blip>
+          <a:srcRect/>
+          <a:stretch>
+            <a:fillRect/>
+          </a:stretch>
+        </p:blipFill>
+        <p:spPr bwMode="auto">
+          <a:xfrm>
+            <a:off x="934324" y="1470157"/>
+            <a:ext cx="10323351" cy="4739256"/>
+          </a:xfrm>
+          <a:prstGeom prst="rect">
+            <a:avLst/>
+          </a:prstGeom>
+          <a:noFill/>
+          <a:ln>
+            <a:noFill/>
+          </a:ln>
+        </p:spPr>
+      </p:pic>
+      <p:sp>
+        <p:nvSpPr>
+          <p:cNvPr id="3" name="TextBox 2">
+            <a:extLst>
+              <a:ext uri="{FF2B5EF4-FFF2-40B4-BE49-F238E27FC236}">
+                <a16:creationId xmlns:a16="http://schemas.microsoft.com/office/drawing/2014/main" id="{7517C4A9-D243-8075-141D-8058BF21067A}"/>
+              </a:ext>
+            </a:extLst>
+          </p:cNvPr>
+          <p:cNvSpPr txBox="1"/>
+          <p:nvPr/>
+        </p:nvSpPr>
+        <p:spPr>
+          <a:xfrm>
+            <a:off x="5181601" y="228214"/>
+            <a:ext cx="7006688" cy="2677656"/>
+          </a:xfrm>
+          <a:prstGeom prst="rect">
+            <a:avLst/>
+          </a:prstGeom>
+          <a:noFill/>
+        </p:spPr>
+        <p:txBody>
+          <a:bodyPr wrap="square" rtlCol="0">
+            <a:spAutoFit/>
+          </a:bodyPr>
+          <a:lstStyle/>
+          <a:p>
+            <a:pPr marL="457200" indent="-457200">
+              <a:buFont typeface="Arial" panose="020B0604020202020204" pitchFamily="34" charset="0"/>
+              <a:buChar char="•"/>
+            </a:pPr>
+            <a:r>
+              <a:rPr lang="en-US" sz="2400" dirty="0"/>
+              <a:t>66 NH3/CH4 observations through Nov. 28, 2023</a:t>
+            </a:r>
+          </a:p>
+          <a:p>
+            <a:pPr marL="914400" lvl="1" indent="-457200">
+              <a:buFont typeface="Arial" panose="020B0604020202020204" pitchFamily="34" charset="0"/>
+              <a:buChar char="•"/>
+            </a:pPr>
+            <a:r>
+              <a:rPr lang="en-US" sz="2000" dirty="0"/>
+              <a:t>2022: 18 with SCT, 2 with VLT</a:t>
+            </a:r>
+          </a:p>
+          <a:p>
+            <a:pPr marL="914400" lvl="1" indent="-457200">
+              <a:buFont typeface="Arial" panose="020B0604020202020204" pitchFamily="34" charset="0"/>
+              <a:buChar char="•"/>
+            </a:pPr>
+            <a:r>
+              <a:rPr lang="en-US" sz="2000" dirty="0"/>
+              <a:t>2023 45 with SCT</a:t>
+            </a:r>
+            <a:endParaRPr lang="en-US" sz="2400" dirty="0"/>
+          </a:p>
+          <a:p>
+            <a:pPr marL="914400" lvl="1" indent="-457200">
+              <a:buFont typeface="Arial" panose="020B0604020202020204" pitchFamily="34" charset="0"/>
+              <a:buChar char="•"/>
+            </a:pPr>
+            <a:r>
+              <a:rPr lang="en-US" sz="2000" dirty="0"/>
+              <a:t>145 CH4 cloud holes / deep clouds</a:t>
+            </a:r>
+          </a:p>
+          <a:p>
+            <a:pPr marL="914400" lvl="1" indent="-457200">
+              <a:buFont typeface="Arial" panose="020B0604020202020204" pitchFamily="34" charset="0"/>
+              <a:buChar char="•"/>
+            </a:pPr>
+            <a:r>
+              <a:rPr lang="en-US" sz="2000" dirty="0"/>
+              <a:t>146 NH3 enhanced regions</a:t>
+            </a:r>
+          </a:p>
+          <a:p>
+            <a:pPr marL="457200" indent="-457200">
+              <a:buFont typeface="Arial" panose="020B0604020202020204" pitchFamily="34" charset="0"/>
+              <a:buChar char="•"/>
+            </a:pPr>
+            <a:r>
+              <a:rPr lang="en-US" sz="2400" dirty="0"/>
+              <a:t>Dark Projections from </a:t>
+            </a:r>
+            <a:r>
+              <a:rPr lang="en-US" sz="2400" dirty="0" err="1"/>
+              <a:t>WinJUPOS</a:t>
+            </a:r>
+            <a:endParaRPr lang="en-US" sz="2400" dirty="0"/>
+          </a:p>
+          <a:p>
+            <a:pPr marL="914400" lvl="1" indent="-457200">
+              <a:buFont typeface="Arial" panose="020B0604020202020204" pitchFamily="34" charset="0"/>
+              <a:buChar char="•"/>
+            </a:pPr>
+            <a:r>
+              <a:rPr lang="en-US" sz="2000" dirty="0"/>
+              <a:t>Total 7082 positions between 6/1/2022 and 11/22/2023</a:t>
+            </a:r>
+          </a:p>
+          <a:p>
+            <a:pPr marL="914400" lvl="1" indent="-457200">
+              <a:buFont typeface="Arial" panose="020B0604020202020204" pitchFamily="34" charset="0"/>
+              <a:buChar char="•"/>
+            </a:pPr>
+            <a:endParaRPr lang="en-US" sz="2000" dirty="0"/>
+          </a:p>
+        </p:txBody>
+      </p:sp>
+    </p:spTree>
+    <p:extLst>
+      <p:ext uri="{BB962C8B-B14F-4D97-AF65-F5344CB8AC3E}">
+        <p14:creationId xmlns:p14="http://schemas.microsoft.com/office/powerpoint/2010/main" val="479727176"/>
+      </p:ext>
+    </p:extLst>
+  </p:cSld>
+  <p:clrMapOvr>
+    <a:masterClrMapping/>
+  </p:clrMapOvr>
+</p:sld>
+</file>
+
+<file path=ppt/slides/slide3.xml><?xml version="1.0" encoding="utf-8"?>
+<p:sld xmlns:a="http://schemas.openxmlformats.org/drawingml/2006/main" xmlns:r="http://schemas.openxmlformats.org/officeDocument/2006/relationships" xmlns:p="http://schemas.openxmlformats.org/presentationml/2006/main">
+  <p:cSld>
+    <p:spTree>
+      <p:nvGrpSpPr>
+        <p:cNvPr id="1" name=""/>
+        <p:cNvGrpSpPr/>
+        <p:nvPr/>
+      </p:nvGrpSpPr>
+      <p:grpSpPr>
+        <a:xfrm>
+          <a:off x="0" y="0"/>
+          <a:ext cx="0" cy="0"/>
+          <a:chOff x="0" y="0"/>
+          <a:chExt cx="0" cy="0"/>
+        </a:xfrm>
+      </p:grpSpPr>
+      <p:pic>
+        <p:nvPicPr>
+          <p:cNvPr id="4" name="Picture 3" descr="A diagram of a formation of a human body&#10;&#10;Description automatically generated with medium confidence">
+            <a:extLst>
+              <a:ext uri="{FF2B5EF4-FFF2-40B4-BE49-F238E27FC236}">
+                <a16:creationId xmlns:a16="http://schemas.microsoft.com/office/drawing/2014/main" id="{0EB05E4D-36D9-D13C-344A-4A6C3749A111}"/>
+              </a:ext>
+            </a:extLst>
+          </p:cNvPr>
+          <p:cNvPicPr>
+            <a:picLocks noChangeAspect="1"/>
+          </p:cNvPicPr>
+          <p:nvPr/>
+        </p:nvPicPr>
+        <p:blipFill>
+          <a:blip r:embed="rId2"/>
+          <a:stretch>
+            <a:fillRect/>
+          </a:stretch>
+        </p:blipFill>
+        <p:spPr>
+          <a:xfrm>
+            <a:off x="-1" y="3174590"/>
+            <a:ext cx="6879265" cy="3437019"/>
+          </a:xfrm>
+          <a:prstGeom prst="rect">
+            <a:avLst/>
+          </a:prstGeom>
+        </p:spPr>
+      </p:pic>
+      <p:pic>
+        <p:nvPicPr>
+          <p:cNvPr id="3" name="Picture 2" descr="A screenshot of a graph&#10;&#10;Description automatically generated">
+            <a:extLst>
+              <a:ext uri="{FF2B5EF4-FFF2-40B4-BE49-F238E27FC236}">
+                <a16:creationId xmlns:a16="http://schemas.microsoft.com/office/drawing/2014/main" id="{4065F12B-ABF4-109C-9341-DE6C08B53BB8}"/>
+              </a:ext>
+            </a:extLst>
+          </p:cNvPr>
+          <p:cNvPicPr>
+            <a:picLocks noChangeAspect="1"/>
+          </p:cNvPicPr>
+          <p:nvPr/>
+        </p:nvPicPr>
+        <p:blipFill>
+          <a:blip r:embed="rId3">
+            <a:extLst>
+              <a:ext uri="{28A0092B-C50C-407E-A947-70E740481C1C}">
+                <a14:useLocalDpi xmlns:a14="http://schemas.microsoft.com/office/drawing/2010/main" val="0"/>
+              </a:ext>
+            </a:extLst>
+          </a:blip>
+          <a:stretch>
+            <a:fillRect/>
+          </a:stretch>
+        </p:blipFill>
+        <p:spPr>
+          <a:xfrm>
+            <a:off x="6115779" y="694945"/>
+            <a:ext cx="5700544" cy="5700544"/>
+          </a:xfrm>
+          <a:prstGeom prst="rect">
+            <a:avLst/>
+          </a:prstGeom>
+        </p:spPr>
+      </p:pic>
+      <p:sp>
+        <p:nvSpPr>
+          <p:cNvPr id="5" name="TextBox 4">
+            <a:extLst>
+              <a:ext uri="{FF2B5EF4-FFF2-40B4-BE49-F238E27FC236}">
+                <a16:creationId xmlns:a16="http://schemas.microsoft.com/office/drawing/2014/main" id="{D51C9AEB-C5EA-FCDD-CCFD-3A769FACDEFB}"/>
+              </a:ext>
+            </a:extLst>
+          </p:cNvPr>
+          <p:cNvSpPr txBox="1"/>
+          <p:nvPr/>
+        </p:nvSpPr>
+        <p:spPr>
+          <a:xfrm>
+            <a:off x="73892" y="450284"/>
+            <a:ext cx="7006688" cy="1815882"/>
+          </a:xfrm>
+          <a:prstGeom prst="rect">
+            <a:avLst/>
+          </a:prstGeom>
+          <a:noFill/>
+        </p:spPr>
+        <p:txBody>
+          <a:bodyPr wrap="square" rtlCol="0">
+            <a:spAutoFit/>
+          </a:bodyPr>
+          <a:lstStyle/>
+          <a:p>
+            <a:pPr marL="457200" indent="-457200">
+              <a:buFont typeface="Arial" panose="020B0604020202020204" pitchFamily="34" charset="0"/>
+              <a:buChar char="•"/>
+            </a:pPr>
+            <a:r>
+              <a:rPr lang="en-US" sz="2400" dirty="0"/>
+              <a:t>Add latitude range for CH4 deep clouds</a:t>
+            </a:r>
+          </a:p>
+          <a:p>
+            <a:pPr marL="457200" indent="-457200">
+              <a:buFont typeface="Arial" panose="020B0604020202020204" pitchFamily="34" charset="0"/>
+              <a:buChar char="•"/>
+            </a:pPr>
+            <a:r>
+              <a:rPr lang="en-US" sz="2400" dirty="0"/>
+              <a:t>Fix projections longitude calculation</a:t>
+            </a:r>
+          </a:p>
+          <a:p>
+            <a:pPr marL="457200" indent="-457200">
+              <a:buFont typeface="Arial" panose="020B0604020202020204" pitchFamily="34" charset="0"/>
+              <a:buChar char="•"/>
+            </a:pPr>
+            <a:r>
+              <a:rPr lang="en-US" sz="2400" dirty="0"/>
+              <a:t>Get </a:t>
+            </a:r>
+            <a:r>
+              <a:rPr lang="en-US" sz="2400" dirty="0" err="1"/>
+              <a:t>lat-lon</a:t>
+            </a:r>
+            <a:r>
+              <a:rPr lang="en-US" sz="2400" dirty="0"/>
+              <a:t> scale for Choi image</a:t>
+            </a:r>
+          </a:p>
+          <a:p>
+            <a:pPr marL="457200" indent="-457200">
+              <a:buFont typeface="Arial" panose="020B0604020202020204" pitchFamily="34" charset="0"/>
+              <a:buChar char="•"/>
+            </a:pPr>
+            <a:endParaRPr lang="en-US" sz="2000" dirty="0"/>
+          </a:p>
+          <a:p>
+            <a:pPr marL="914400" lvl="1" indent="-457200">
+              <a:buFont typeface="Arial" panose="020B0604020202020204" pitchFamily="34" charset="0"/>
+              <a:buChar char="•"/>
+            </a:pPr>
+            <a:endParaRPr lang="en-US" sz="2000" dirty="0"/>
+          </a:p>
+        </p:txBody>
+      </p:sp>
+    </p:spTree>
+    <p:extLst>
+      <p:ext uri="{BB962C8B-B14F-4D97-AF65-F5344CB8AC3E}">
+        <p14:creationId xmlns:p14="http://schemas.microsoft.com/office/powerpoint/2010/main" val="2323899543"/>
+      </p:ext>
+    </p:extLst>
+  </p:cSld>
+  <p:clrMapOvr>
+    <a:masterClrMapping/>
+  </p:clrMapOvr>
+</p:sld>
+</file>
+
+<file path=ppt/slides/slide4.xml><?xml version="1.0" encoding="utf-8"?>
+<p:sld xmlns:a="http://schemas.openxmlformats.org/drawingml/2006/main" xmlns:r="http://schemas.openxmlformats.org/officeDocument/2006/relationships" xmlns:p="http://schemas.openxmlformats.org/presentationml/2006/main">
+  <p:cSld>
+    <p:spTree>
+      <p:nvGrpSpPr>
+        <p:cNvPr id="1" name=""/>
+        <p:cNvGrpSpPr/>
+        <p:nvPr/>
+      </p:nvGrpSpPr>
+      <p:grpSpPr>
+        <a:xfrm>
+          <a:off x="0" y="0"/>
+          <a:ext cx="0" cy="0"/>
+          <a:chOff x="0" y="0"/>
+          <a:chExt cx="0" cy="0"/>
+        </a:xfrm>
+      </p:grpSpPr>
+      <p:grpSp>
+        <p:nvGrpSpPr>
+          <p:cNvPr id="5" name="Group 4">
+            <a:extLst>
+              <a:ext uri="{FF2B5EF4-FFF2-40B4-BE49-F238E27FC236}">
+                <a16:creationId xmlns:a16="http://schemas.microsoft.com/office/drawing/2014/main" id="{1DDCD4B5-E811-FE14-DB5C-41835BB5CF2C}"/>
+              </a:ext>
+            </a:extLst>
+          </p:cNvPr>
+          <p:cNvGrpSpPr/>
+          <p:nvPr/>
+        </p:nvGrpSpPr>
+        <p:grpSpPr>
+          <a:xfrm>
+            <a:off x="7438034" y="1"/>
+            <a:ext cx="4753966" cy="3429000"/>
+            <a:chOff x="7947024" y="318009"/>
+            <a:chExt cx="3503849" cy="2527300"/>
+          </a:xfrm>
+        </p:grpSpPr>
+        <p:pic>
+          <p:nvPicPr>
+            <p:cNvPr id="2" name="Picture 1">
+              <a:extLst>
+                <a:ext uri="{FF2B5EF4-FFF2-40B4-BE49-F238E27FC236}">
+                  <a16:creationId xmlns:a16="http://schemas.microsoft.com/office/drawing/2014/main" id="{0C694559-7E52-EB8E-998C-D2E621972265}"/>
+                </a:ext>
+              </a:extLst>
+            </p:cNvPr>
+            <p:cNvPicPr>
+              <a:picLocks noChangeAspect="1"/>
+            </p:cNvPicPr>
+            <p:nvPr/>
+          </p:nvPicPr>
+          <p:blipFill rotWithShape="1">
+            <a:blip r:embed="rId2" cstate="print">
+              <a:extLst>
+                <a:ext uri="{28A0092B-C50C-407E-A947-70E740481C1C}">
+                  <a14:useLocalDpi xmlns:a14="http://schemas.microsoft.com/office/drawing/2010/main" val="0"/>
+                </a:ext>
+              </a:extLst>
+            </a:blip>
+            <a:srcRect l="5801" t="14657" r="46385" b="16366"/>
+            <a:stretch/>
+          </p:blipFill>
+          <p:spPr bwMode="auto">
+            <a:xfrm>
+              <a:off x="7947024" y="318009"/>
+              <a:ext cx="3503849" cy="2527300"/>
+            </a:xfrm>
+            <a:prstGeom prst="rect">
+              <a:avLst/>
+            </a:prstGeom>
+            <a:noFill/>
+            <a:ln>
+              <a:noFill/>
+            </a:ln>
+          </p:spPr>
+        </p:pic>
+        <p:pic>
+          <p:nvPicPr>
+            <p:cNvPr id="3" name="Picture 2">
+              <a:extLst>
+                <a:ext uri="{FF2B5EF4-FFF2-40B4-BE49-F238E27FC236}">
+                  <a16:creationId xmlns:a16="http://schemas.microsoft.com/office/drawing/2014/main" id="{FF603425-8304-9173-E194-466C4CCE9167}"/>
+                </a:ext>
+              </a:extLst>
+            </p:cNvPr>
+            <p:cNvPicPr>
+              <a:picLocks noChangeAspect="1"/>
+            </p:cNvPicPr>
+            <p:nvPr/>
+          </p:nvPicPr>
+          <p:blipFill rotWithShape="1">
+            <a:blip r:embed="rId2" cstate="print">
+              <a:extLst>
+                <a:ext uri="{28A0092B-C50C-407E-A947-70E740481C1C}">
+                  <a14:useLocalDpi xmlns:a14="http://schemas.microsoft.com/office/drawing/2010/main" val="0"/>
+                </a:ext>
+              </a:extLst>
+            </a:blip>
+            <a:srcRect l="8012" r="58482" b="92890"/>
+            <a:stretch/>
+          </p:blipFill>
+          <p:spPr bwMode="auto">
+            <a:xfrm>
+              <a:off x="8258711" y="318009"/>
+              <a:ext cx="2455333" cy="260494"/>
+            </a:xfrm>
+            <a:prstGeom prst="rect">
+              <a:avLst/>
+            </a:prstGeom>
+            <a:noFill/>
+            <a:ln>
+              <a:noFill/>
+            </a:ln>
+          </p:spPr>
+        </p:pic>
+      </p:grpSp>
+      <p:grpSp>
+        <p:nvGrpSpPr>
+          <p:cNvPr id="8" name="Group 7">
+            <a:extLst>
+              <a:ext uri="{FF2B5EF4-FFF2-40B4-BE49-F238E27FC236}">
+                <a16:creationId xmlns:a16="http://schemas.microsoft.com/office/drawing/2014/main" id="{A1FBBE1B-29EA-B7B2-78EF-79E5B0A7D0FF}"/>
+              </a:ext>
+            </a:extLst>
+          </p:cNvPr>
+          <p:cNvGrpSpPr/>
+          <p:nvPr/>
+        </p:nvGrpSpPr>
+        <p:grpSpPr>
+          <a:xfrm>
+            <a:off x="7438035" y="3429000"/>
+            <a:ext cx="4753966" cy="3393848"/>
+            <a:chOff x="4227001" y="3428999"/>
+            <a:chExt cx="3211033" cy="2292351"/>
+          </a:xfrm>
+        </p:grpSpPr>
+        <p:pic>
+          <p:nvPicPr>
+            <p:cNvPr id="7" name="Picture 6">
+              <a:extLst>
+                <a:ext uri="{FF2B5EF4-FFF2-40B4-BE49-F238E27FC236}">
+                  <a16:creationId xmlns:a16="http://schemas.microsoft.com/office/drawing/2014/main" id="{25D2583B-8D56-D3B2-681D-A9265A8F4F92}"/>
+                </a:ext>
+              </a:extLst>
+            </p:cNvPr>
+            <p:cNvPicPr>
+              <a:picLocks noChangeAspect="1"/>
+            </p:cNvPicPr>
+            <p:nvPr/>
+          </p:nvPicPr>
+          <p:blipFill rotWithShape="1">
+            <a:blip r:embed="rId3" cstate="print">
+              <a:extLst>
+                <a:ext uri="{28A0092B-C50C-407E-A947-70E740481C1C}">
+                  <a14:useLocalDpi xmlns:a14="http://schemas.microsoft.com/office/drawing/2010/main" val="0"/>
+                </a:ext>
+              </a:extLst>
+            </a:blip>
+            <a:srcRect l="5111" t="14984" r="46243" b="15560"/>
+            <a:stretch/>
+          </p:blipFill>
+          <p:spPr bwMode="auto">
+            <a:xfrm>
+              <a:off x="4227001" y="3429000"/>
+              <a:ext cx="3211033" cy="2292350"/>
+            </a:xfrm>
+            <a:prstGeom prst="rect">
+              <a:avLst/>
+            </a:prstGeom>
+            <a:noFill/>
+            <a:ln>
+              <a:noFill/>
+            </a:ln>
+          </p:spPr>
+        </p:pic>
+        <p:pic>
+          <p:nvPicPr>
+            <p:cNvPr id="6" name="Picture 5">
+              <a:extLst>
+                <a:ext uri="{FF2B5EF4-FFF2-40B4-BE49-F238E27FC236}">
+                  <a16:creationId xmlns:a16="http://schemas.microsoft.com/office/drawing/2014/main" id="{9C7C48E5-C0AE-6797-E21A-5B7A90A347CA}"/>
+                </a:ext>
+              </a:extLst>
+            </p:cNvPr>
+            <p:cNvPicPr>
+              <a:picLocks noChangeAspect="1"/>
+            </p:cNvPicPr>
+            <p:nvPr/>
+          </p:nvPicPr>
+          <p:blipFill rotWithShape="1">
+            <a:blip r:embed="rId3" cstate="print">
+              <a:extLst>
+                <a:ext uri="{28A0092B-C50C-407E-A947-70E740481C1C}">
+                  <a14:useLocalDpi xmlns:a14="http://schemas.microsoft.com/office/drawing/2010/main" val="0"/>
+                </a:ext>
+              </a:extLst>
+            </a:blip>
+            <a:srcRect l="5111" r="57046" b="93698"/>
+            <a:stretch/>
+          </p:blipFill>
+          <p:spPr bwMode="auto">
+            <a:xfrm>
+              <a:off x="4373051" y="3428999"/>
+              <a:ext cx="2497913" cy="207963"/>
+            </a:xfrm>
+            <a:prstGeom prst="rect">
+              <a:avLst/>
+            </a:prstGeom>
+            <a:noFill/>
+            <a:ln>
+              <a:noFill/>
+            </a:ln>
+          </p:spPr>
+        </p:pic>
+      </p:grpSp>
+      <p:graphicFrame>
+        <p:nvGraphicFramePr>
+          <p:cNvPr id="9" name="Table 8">
+            <a:extLst>
+              <a:ext uri="{FF2B5EF4-FFF2-40B4-BE49-F238E27FC236}">
+                <a16:creationId xmlns:a16="http://schemas.microsoft.com/office/drawing/2014/main" id="{FB8F0484-B536-7DC5-5E08-074F32022BE7}"/>
+              </a:ext>
+            </a:extLst>
+          </p:cNvPr>
+          <p:cNvGraphicFramePr>
+            <a:graphicFrameLocks noGrp="1"/>
+          </p:cNvGraphicFramePr>
+          <p:nvPr>
+            <p:extLst>
+              <p:ext uri="{D42A27DB-BD31-4B8C-83A1-F6EECF244321}">
+                <p14:modId xmlns:p14="http://schemas.microsoft.com/office/powerpoint/2010/main" val="3493227925"/>
+              </p:ext>
+            </p:extLst>
+          </p:nvPr>
+        </p:nvGraphicFramePr>
+        <p:xfrm>
+          <a:off x="946298" y="2095328"/>
+          <a:ext cx="3352800" cy="456249"/>
+        </p:xfrm>
+        <a:graphic>
+          <a:graphicData uri="http://schemas.openxmlformats.org/drawingml/2006/table">
+            <a:tbl>
+              <a:tblPr firstRow="1" firstCol="1" bandRow="1">
+                <a:tableStyleId>{5C22544A-7EE6-4342-B048-85BDC9FD1C3A}</a:tableStyleId>
+              </a:tblPr>
+              <a:tblGrid>
+                <a:gridCol w="3352800">
+                  <a:extLst>
+                    <a:ext uri="{9D8B030D-6E8A-4147-A177-3AD203B41FA5}">
+                      <a16:colId xmlns:a16="http://schemas.microsoft.com/office/drawing/2014/main" val="772042237"/>
+                    </a:ext>
+                  </a:extLst>
+                </a:gridCol>
+              </a:tblGrid>
+              <a:tr h="0">
+                <a:tc>
+                  <a:txBody>
+                    <a:bodyPr/>
+                    <a:lstStyle/>
+                    <a:p>
+                      <a:pPr marL="0" marR="0">
+                        <a:lnSpc>
+                          <a:spcPct val="107000"/>
+                        </a:lnSpc>
+                        <a:spcBef>
+                          <a:spcPts val="0"/>
+                        </a:spcBef>
+                        <a:spcAft>
+                          <a:spcPts val="0"/>
+                        </a:spcAft>
+                      </a:pPr>
+                      <a:endParaRPr lang="en-US" sz="1000" kern="0">
+                        <a:effectLst/>
+                        <a:latin typeface="Times New Roman" panose="02020603050405020304" pitchFamily="18" charset="0"/>
+                        <a:ea typeface="Times New Roman" panose="02020603050405020304" pitchFamily="18" charset="0"/>
+                        <a:cs typeface="Arial" panose="020B0604020202020204" pitchFamily="34" charset="0"/>
+                      </a:endParaRPr>
+                    </a:p>
+                  </a:txBody>
+                  <a:tcPr marL="0" marR="0" marT="0" marB="0"/>
+                </a:tc>
+                <a:extLst>
+                  <a:ext uri="{0D108BD9-81ED-4DB2-BD59-A6C34878D82A}">
+                    <a16:rowId xmlns:a16="http://schemas.microsoft.com/office/drawing/2014/main" val="4187367588"/>
+                  </a:ext>
+                </a:extLst>
+              </a:tr>
+              <a:tr h="0">
+                <a:tc>
+                  <a:txBody>
+                    <a:bodyPr/>
+                    <a:lstStyle/>
+                    <a:p>
+                      <a:pPr marL="0" marR="0">
+                        <a:lnSpc>
+                          <a:spcPct val="107000"/>
+                        </a:lnSpc>
+                        <a:spcBef>
+                          <a:spcPts val="0"/>
+                        </a:spcBef>
+                        <a:spcAft>
+                          <a:spcPts val="0"/>
+                        </a:spcAft>
+                      </a:pPr>
+                      <a:endParaRPr lang="en-US" sz="1000" kern="0">
+                        <a:effectLst/>
+                        <a:latin typeface="Times New Roman" panose="02020603050405020304" pitchFamily="18" charset="0"/>
+                        <a:ea typeface="Times New Roman" panose="02020603050405020304" pitchFamily="18" charset="0"/>
+                        <a:cs typeface="Arial" panose="020B0604020202020204" pitchFamily="34" charset="0"/>
+                      </a:endParaRPr>
+                    </a:p>
+                  </a:txBody>
+                  <a:tcPr marL="0" marR="0" marT="0" marB="0"/>
+                </a:tc>
+                <a:extLst>
+                  <a:ext uri="{0D108BD9-81ED-4DB2-BD59-A6C34878D82A}">
+                    <a16:rowId xmlns:a16="http://schemas.microsoft.com/office/drawing/2014/main" val="1139880921"/>
+                  </a:ext>
+                </a:extLst>
+              </a:tr>
+              <a:tr h="0">
+                <a:tc>
+                  <a:txBody>
+                    <a:bodyPr/>
+                    <a:lstStyle/>
+                    <a:p>
+                      <a:pPr marL="0" marR="0" algn="ctr">
+                        <a:lnSpc>
+                          <a:spcPct val="107000"/>
+                        </a:lnSpc>
+                        <a:spcBef>
+                          <a:spcPts val="0"/>
+                        </a:spcBef>
+                        <a:spcAft>
+                          <a:spcPts val="0"/>
+                        </a:spcAft>
+                      </a:pPr>
+                      <a:endParaRPr lang="en-US" sz="1000" kern="0" dirty="0">
+                        <a:effectLst/>
+                        <a:latin typeface="Times New Roman" panose="02020603050405020304" pitchFamily="18" charset="0"/>
+                        <a:ea typeface="Times New Roman" panose="02020603050405020304" pitchFamily="18" charset="0"/>
+                        <a:cs typeface="Arial" panose="020B0604020202020204" pitchFamily="34" charset="0"/>
+                      </a:endParaRPr>
+                    </a:p>
+                  </a:txBody>
+                  <a:tcPr marL="0" marR="0" marT="0" marB="0"/>
+                </a:tc>
+                <a:extLst>
+                  <a:ext uri="{0D108BD9-81ED-4DB2-BD59-A6C34878D82A}">
+                    <a16:rowId xmlns:a16="http://schemas.microsoft.com/office/drawing/2014/main" val="4288029485"/>
+                  </a:ext>
+                </a:extLst>
+              </a:tr>
+            </a:tbl>
+          </a:graphicData>
+        </a:graphic>
+      </p:graphicFrame>
+      <p:grpSp>
+        <p:nvGrpSpPr>
+          <p:cNvPr id="10" name="Group 9">
+            <a:extLst>
+              <a:ext uri="{FF2B5EF4-FFF2-40B4-BE49-F238E27FC236}">
+                <a16:creationId xmlns:a16="http://schemas.microsoft.com/office/drawing/2014/main" id="{AE9095A2-2437-B807-C1E2-9D91BE1A091C}"/>
+              </a:ext>
+            </a:extLst>
+          </p:cNvPr>
+          <p:cNvGrpSpPr/>
+          <p:nvPr/>
+        </p:nvGrpSpPr>
+        <p:grpSpPr>
+          <a:xfrm>
+            <a:off x="0" y="0"/>
+            <a:ext cx="4848448" cy="6853519"/>
+            <a:chOff x="-1" y="0"/>
+            <a:chExt cx="5022851" cy="7100046"/>
+          </a:xfrm>
+        </p:grpSpPr>
+        <p:pic>
+          <p:nvPicPr>
+            <p:cNvPr id="1027" name="Picture 12">
+              <a:extLst>
+                <a:ext uri="{FF2B5EF4-FFF2-40B4-BE49-F238E27FC236}">
+                  <a16:creationId xmlns:a16="http://schemas.microsoft.com/office/drawing/2014/main" id="{5D3DE044-246F-0207-327F-FADFB27BCBFC}"/>
+                </a:ext>
+              </a:extLst>
+            </p:cNvPr>
+            <p:cNvPicPr>
+              <a:picLocks noChangeAspect="1" noChangeArrowheads="1"/>
+            </p:cNvPicPr>
+            <p:nvPr/>
+          </p:nvPicPr>
+          <p:blipFill>
+            <a:blip r:embed="rId4">
+              <a:extLst>
+                <a:ext uri="{28A0092B-C50C-407E-A947-70E740481C1C}">
+                  <a14:useLocalDpi xmlns:a14="http://schemas.microsoft.com/office/drawing/2010/main" val="0"/>
+                </a:ext>
+              </a:extLst>
+            </a:blip>
+            <a:srcRect/>
+            <a:stretch>
+              <a:fillRect/>
+            </a:stretch>
+          </p:blipFill>
+          <p:spPr bwMode="auto">
+            <a:xfrm>
+              <a:off x="0" y="0"/>
+              <a:ext cx="5022850" cy="2508250"/>
+            </a:xfrm>
+            <a:prstGeom prst="rect">
+              <a:avLst/>
+            </a:prstGeom>
+            <a:noFill/>
+            <a:extLst>
+              <a:ext uri="{909E8E84-426E-40DD-AFC4-6F175D3DCCD1}">
+                <a14:hiddenFill xmlns:a14="http://schemas.microsoft.com/office/drawing/2010/main">
+                  <a:solidFill>
+                    <a:srgbClr val="FFFFFF"/>
+                  </a:solidFill>
+                </a14:hiddenFill>
+              </a:ext>
+            </a:extLst>
+          </p:spPr>
+        </p:pic>
+        <p:pic>
+          <p:nvPicPr>
+            <p:cNvPr id="1026" name="Picture 13">
+              <a:extLst>
+                <a:ext uri="{FF2B5EF4-FFF2-40B4-BE49-F238E27FC236}">
+                  <a16:creationId xmlns:a16="http://schemas.microsoft.com/office/drawing/2014/main" id="{581F1A92-EA82-BF79-B298-F0B658B003F1}"/>
+                </a:ext>
+              </a:extLst>
+            </p:cNvPr>
+            <p:cNvPicPr>
+              <a:picLocks noChangeAspect="1" noChangeArrowheads="1"/>
+            </p:cNvPicPr>
+            <p:nvPr/>
+          </p:nvPicPr>
+          <p:blipFill>
+            <a:blip r:embed="rId5">
+              <a:extLst>
+                <a:ext uri="{28A0092B-C50C-407E-A947-70E740481C1C}">
+                  <a14:useLocalDpi xmlns:a14="http://schemas.microsoft.com/office/drawing/2010/main" val="0"/>
+                </a:ext>
+              </a:extLst>
+            </a:blip>
+            <a:srcRect/>
+            <a:stretch>
+              <a:fillRect/>
+            </a:stretch>
+          </p:blipFill>
+          <p:spPr bwMode="auto">
+            <a:xfrm>
+              <a:off x="-1" y="2295898"/>
+              <a:ext cx="5022850" cy="2508250"/>
+            </a:xfrm>
+            <a:prstGeom prst="rect">
+              <a:avLst/>
+            </a:prstGeom>
+            <a:noFill/>
+            <a:extLst>
+              <a:ext uri="{909E8E84-426E-40DD-AFC4-6F175D3DCCD1}">
+                <a14:hiddenFill xmlns:a14="http://schemas.microsoft.com/office/drawing/2010/main">
+                  <a:solidFill>
+                    <a:srgbClr val="FFFFFF"/>
+                  </a:solidFill>
+                </a14:hiddenFill>
+              </a:ext>
+            </a:extLst>
+          </p:spPr>
+        </p:pic>
+        <p:pic>
+          <p:nvPicPr>
+            <p:cNvPr id="1025" name="Picture 14">
+              <a:extLst>
+                <a:ext uri="{FF2B5EF4-FFF2-40B4-BE49-F238E27FC236}">
+                  <a16:creationId xmlns:a16="http://schemas.microsoft.com/office/drawing/2014/main" id="{7C64C8BD-1A46-6C11-5297-4CE61B7AAD2C}"/>
+                </a:ext>
+              </a:extLst>
+            </p:cNvPr>
+            <p:cNvPicPr>
+              <a:picLocks noChangeAspect="1" noChangeArrowheads="1"/>
+            </p:cNvPicPr>
+            <p:nvPr/>
+          </p:nvPicPr>
+          <p:blipFill>
+            <a:blip r:embed="rId6">
+              <a:extLst>
+                <a:ext uri="{28A0092B-C50C-407E-A947-70E740481C1C}">
+                  <a14:useLocalDpi xmlns:a14="http://schemas.microsoft.com/office/drawing/2010/main" val="0"/>
+                </a:ext>
+              </a:extLst>
+            </a:blip>
+            <a:srcRect/>
+            <a:stretch>
+              <a:fillRect/>
+            </a:stretch>
+          </p:blipFill>
+          <p:spPr bwMode="auto">
+            <a:xfrm>
+              <a:off x="0" y="4591796"/>
+              <a:ext cx="5022850" cy="2508250"/>
+            </a:xfrm>
+            <a:prstGeom prst="rect">
+              <a:avLst/>
+            </a:prstGeom>
+            <a:noFill/>
+            <a:extLst>
+              <a:ext uri="{909E8E84-426E-40DD-AFC4-6F175D3DCCD1}">
+                <a14:hiddenFill xmlns:a14="http://schemas.microsoft.com/office/drawing/2010/main">
+                  <a:solidFill>
+                    <a:srgbClr val="FFFFFF"/>
+                  </a:solidFill>
+                </a14:hiddenFill>
+              </a:ext>
+            </a:extLst>
+          </p:spPr>
+        </p:pic>
+      </p:grpSp>
+    </p:spTree>
+    <p:extLst>
+      <p:ext uri="{BB962C8B-B14F-4D97-AF65-F5344CB8AC3E}">
+        <p14:creationId xmlns:p14="http://schemas.microsoft.com/office/powerpoint/2010/main" val="3099150890"/>
+      </p:ext>
+    </p:extLst>
+  </p:cSld>
+  <p:clrMapOvr>
+    <a:masterClrMapping/>
+  </p:clrMapOvr>
+</p:sld>
+</file>
+
 <file path=ppt/theme/theme1.xml><?xml version="1.0" encoding="utf-8"?>
 <a:theme xmlns:a="http://schemas.openxmlformats.org/drawingml/2006/main" name="Office Theme">
   <a:themeElements>

</xml_diff>